<commit_message>
Upload Milestone2 files KB
Persona & Strategy, Content Inventory copy, Content Strategy additions
</commit_message>
<xml_diff>
--- a/working_documents/Milestone2/KB - persona.pptx
+++ b/working_documents/Milestone2/KB - persona.pptx
@@ -107,6 +107,36 @@
       </a:defRPr>
     </a:lvl9pPr>
   </p:defaultTextStyle>
+  <p:extLst>
+    <p:ext uri="{EFAFB233-063F-42B5-8137-9DF3F51BA10A}">
+      <p15:sldGuideLst xmlns:p15="http://schemas.microsoft.com/office/powerpoint/2012/main">
+        <p15:guide id="1" orient="horz" pos="2160">
+          <p15:clr>
+            <a:srgbClr val="A4A3A4"/>
+          </p15:clr>
+        </p15:guide>
+        <p15:guide id="2" pos="2880">
+          <p15:clr>
+            <a:srgbClr val="A4A3A4"/>
+          </p15:clr>
+        </p15:guide>
+      </p15:sldGuideLst>
+    </p:ext>
+    <p:ext uri="{2D200454-40CA-4A62-9FC3-DE9A4176ACB9}">
+      <p15:notesGuideLst xmlns:p15="http://schemas.microsoft.com/office/powerpoint/2012/main">
+        <p15:guide id="1" orient="horz" pos="2880">
+          <p15:clr>
+            <a:srgbClr val="A4A3A4"/>
+          </p15:clr>
+        </p15:guide>
+        <p15:guide id="2" pos="2160">
+          <p15:clr>
+            <a:srgbClr val="A4A3A4"/>
+          </p15:clr>
+        </p15:guide>
+      </p15:notesGuideLst>
+    </p:ext>
+  </p:extLst>
 </p:presentation>
 </file>
 
@@ -193,7 +223,7 @@
             <a:fld id="{7F10169D-3332-4DE4-A7B4-328D07E50BA1}" type="datetimeFigureOut">
               <a:rPr lang="en-US" smtClean="0"/>
               <a:pPr/>
-              <a:t>27/04/17</a:t>
+              <a:t>4/29/17</a:t>
             </a:fld>
             <a:endParaRPr lang="en-AU"/>
           </a:p>
@@ -646,7 +676,7 @@
             <a:fld id="{DB698D08-D57D-4DF4-80C4-65B2586D98E9}" type="datetimeFigureOut">
               <a:rPr lang="en-US" smtClean="0"/>
               <a:pPr/>
-              <a:t>27/04/17</a:t>
+              <a:t>4/29/17</a:t>
             </a:fld>
             <a:endParaRPr lang="en-AU"/>
           </a:p>
@@ -813,7 +843,7 @@
             <a:fld id="{DB698D08-D57D-4DF4-80C4-65B2586D98E9}" type="datetimeFigureOut">
               <a:rPr lang="en-US" smtClean="0"/>
               <a:pPr/>
-              <a:t>27/04/17</a:t>
+              <a:t>4/29/17</a:t>
             </a:fld>
             <a:endParaRPr lang="en-AU"/>
           </a:p>
@@ -990,7 +1020,7 @@
             <a:fld id="{DB698D08-D57D-4DF4-80C4-65B2586D98E9}" type="datetimeFigureOut">
               <a:rPr lang="en-US" smtClean="0"/>
               <a:pPr/>
-              <a:t>27/04/17</a:t>
+              <a:t>4/29/17</a:t>
             </a:fld>
             <a:endParaRPr lang="en-AU"/>
           </a:p>
@@ -1157,7 +1187,7 @@
             <a:fld id="{DB698D08-D57D-4DF4-80C4-65B2586D98E9}" type="datetimeFigureOut">
               <a:rPr lang="en-US" smtClean="0"/>
               <a:pPr/>
-              <a:t>27/04/17</a:t>
+              <a:t>4/29/17</a:t>
             </a:fld>
             <a:endParaRPr lang="en-AU"/>
           </a:p>
@@ -1400,7 +1430,7 @@
             <a:fld id="{DB698D08-D57D-4DF4-80C4-65B2586D98E9}" type="datetimeFigureOut">
               <a:rPr lang="en-US" smtClean="0"/>
               <a:pPr/>
-              <a:t>27/04/17</a:t>
+              <a:t>4/29/17</a:t>
             </a:fld>
             <a:endParaRPr lang="en-AU"/>
           </a:p>
@@ -1685,7 +1715,7 @@
             <a:fld id="{DB698D08-D57D-4DF4-80C4-65B2586D98E9}" type="datetimeFigureOut">
               <a:rPr lang="en-US" smtClean="0"/>
               <a:pPr/>
-              <a:t>27/04/17</a:t>
+              <a:t>4/29/17</a:t>
             </a:fld>
             <a:endParaRPr lang="en-AU"/>
           </a:p>
@@ -2104,7 +2134,7 @@
             <a:fld id="{DB698D08-D57D-4DF4-80C4-65B2586D98E9}" type="datetimeFigureOut">
               <a:rPr lang="en-US" smtClean="0"/>
               <a:pPr/>
-              <a:t>27/04/17</a:t>
+              <a:t>4/29/17</a:t>
             </a:fld>
             <a:endParaRPr lang="en-AU"/>
           </a:p>
@@ -2219,7 +2249,7 @@
             <a:fld id="{DB698D08-D57D-4DF4-80C4-65B2586D98E9}" type="datetimeFigureOut">
               <a:rPr lang="en-US" smtClean="0"/>
               <a:pPr/>
-              <a:t>27/04/17</a:t>
+              <a:t>4/29/17</a:t>
             </a:fld>
             <a:endParaRPr lang="en-AU"/>
           </a:p>
@@ -2311,7 +2341,7 @@
             <a:fld id="{DB698D08-D57D-4DF4-80C4-65B2586D98E9}" type="datetimeFigureOut">
               <a:rPr lang="en-US" smtClean="0"/>
               <a:pPr/>
-              <a:t>27/04/17</a:t>
+              <a:t>4/29/17</a:t>
             </a:fld>
             <a:endParaRPr lang="en-AU"/>
           </a:p>
@@ -2585,7 +2615,7 @@
             <a:fld id="{DB698D08-D57D-4DF4-80C4-65B2586D98E9}" type="datetimeFigureOut">
               <a:rPr lang="en-US" smtClean="0"/>
               <a:pPr/>
-              <a:t>27/04/17</a:t>
+              <a:t>4/29/17</a:t>
             </a:fld>
             <a:endParaRPr lang="en-AU"/>
           </a:p>
@@ -2835,7 +2865,7 @@
             <a:fld id="{DB698D08-D57D-4DF4-80C4-65B2586D98E9}" type="datetimeFigureOut">
               <a:rPr lang="en-US" smtClean="0"/>
               <a:pPr/>
-              <a:t>27/04/17</a:t>
+              <a:t>4/29/17</a:t>
             </a:fld>
             <a:endParaRPr lang="en-AU"/>
           </a:p>
@@ -3045,7 +3075,7 @@
             <a:fld id="{DB698D08-D57D-4DF4-80C4-65B2586D98E9}" type="datetimeFigureOut">
               <a:rPr lang="en-US" smtClean="0"/>
               <a:pPr/>
-              <a:t>27/04/17</a:t>
+              <a:t>4/29/17</a:t>
             </a:fld>
             <a:endParaRPr lang="en-AU"/>
           </a:p>
@@ -3459,15 +3489,7 @@
                   <a:schemeClr val="bg1"/>
                 </a:solidFill>
               </a:rPr>
-              <a:t>Chris</a:t>
-            </a:r>
-            <a:r>
-              <a:rPr lang="en-AU" sz="2400" dirty="0" smtClean="0">
-                <a:solidFill>
-                  <a:schemeClr val="bg1"/>
-                </a:solidFill>
-              </a:rPr>
-              <a:t/>
+              <a:t>Patrick</a:t>
             </a:r>
             <a:br>
               <a:rPr lang="en-AU" sz="2400" dirty="0" smtClean="0">
@@ -3482,15 +3504,7 @@
                   <a:schemeClr val="bg1"/>
                 </a:solidFill>
               </a:rPr>
-              <a:t>Year 12 Student</a:t>
-            </a:r>
-            <a:r>
-              <a:rPr lang="en-AU" sz="2200" dirty="0" smtClean="0">
-                <a:solidFill>
-                  <a:schemeClr val="bg1"/>
-                </a:solidFill>
-              </a:rPr>
-              <a:t/>
+              <a:t>University Student (IT)</a:t>
             </a:r>
             <a:br>
               <a:rPr lang="en-AU" sz="2200" dirty="0" smtClean="0">
@@ -3572,28 +3586,36 @@
             <a:pPr>
               <a:buNone/>
             </a:pPr>
+            <a:endParaRPr lang="en-AU" sz="1200" b="1" dirty="0" smtClean="0"/>
+          </a:p>
+          <a:p>
+            <a:pPr>
+              <a:buNone/>
+            </a:pPr>
             <a:r>
               <a:rPr lang="en-AU" sz="1200" b="1" dirty="0" smtClean="0"/>
-              <a:t>Chris is finishing year 12 and is unsure what to do after high school, let alone what University to attend.</a:t>
+              <a:t>Patrick is attending Charles Darwin University (CDU) as an IT Student. He is hoping to find work as a software developer when he finishes his degree. He enjoys playing sports, and socialising with friends.</a:t>
             </a:r>
           </a:p>
           <a:p>
             <a:pPr>
               <a:buNone/>
             </a:pPr>
+            <a:endParaRPr lang="en-AU" sz="1200" b="1" dirty="0" smtClean="0"/>
+          </a:p>
+          <a:p>
+            <a:pPr>
+              <a:buNone/>
+            </a:pPr>
             <a:r>
               <a:rPr lang="en-AU" sz="1200" b="1" dirty="0" smtClean="0"/>
-              <a:t>He has a love for robotics and making things to make his life easier, this includes working with PowerShell in windows to help automate daily tasks. He feels this is a path he could be happy with and is constantly reviewing what his career may be.</a:t>
+              <a:t>Patrick has heard about a coding competition held by CDU, and wants to register his interest. One of his classmates was offered employment at a previous code fair, and Patrick was hoping to find similar opportunities for himself.</a:t>
             </a:r>
           </a:p>
           <a:p>
             <a:pPr>
               <a:buNone/>
             </a:pPr>
-            <a:r>
-              <a:rPr lang="en-AU" sz="1200" b="1" dirty="0" smtClean="0"/>
-              <a:t>What Chris wants to find is a site that gets him excited and involved in doing what he loves. He wants to also find out what company's he should be watching or wanting to get employed by. Mostly though he wants to compare himself with people who he feels are “still his age”.</a:t>
-            </a:r>
             <a:endParaRPr lang="en-AU" sz="1200" b="1" dirty="0"/>
           </a:p>
         </p:txBody>
@@ -3638,9 +3660,16 @@
             </a:r>
             <a:r>
               <a:rPr lang="en-AU" sz="1200" dirty="0" smtClean="0"/>
-              <a:t>Student</a:t>
-            </a:r>
-            <a:endParaRPr lang="en-AU" sz="1200" dirty="0" smtClean="0"/>
+              <a:t>Tertiary</a:t>
+            </a:r>
+            <a:r>
+              <a:rPr lang="en-AU" sz="1200" b="1" dirty="0" smtClean="0"/>
+              <a:t> </a:t>
+            </a:r>
+            <a:r>
+              <a:rPr lang="en-AU" sz="1200" dirty="0" smtClean="0"/>
+              <a:t>Student (IT)</a:t>
+            </a:r>
           </a:p>
           <a:p>
             <a:pPr>
@@ -3654,7 +3683,6 @@
               <a:rPr lang="en-AU" sz="1200" dirty="0" smtClean="0"/>
               <a:t>Darwin, NT</a:t>
             </a:r>
-            <a:endParaRPr lang="en-AU" sz="1200" dirty="0" smtClean="0"/>
           </a:p>
           <a:p>
             <a:pPr>
@@ -3666,9 +3694,8 @@
             </a:r>
             <a:r>
               <a:rPr lang="en-AU" sz="1200" dirty="0" smtClean="0"/>
-              <a:t>17</a:t>
-            </a:r>
-            <a:endParaRPr lang="en-AU" sz="1200" dirty="0" smtClean="0"/>
+              <a:t>23</a:t>
+            </a:r>
           </a:p>
           <a:p>
             <a:pPr>
@@ -3680,7 +3707,7 @@
             </a:r>
             <a:r>
               <a:rPr lang="en-AU" sz="1200" dirty="0" smtClean="0"/>
-              <a:t>Gaming, surfing the net, robotics</a:t>
+              <a:t>Indoor soccer, coding, blogging.</a:t>
             </a:r>
             <a:endParaRPr lang="en-AU" sz="1200" dirty="0"/>
           </a:p>
@@ -3694,17 +3721,13 @@
             </a:r>
             <a:r>
               <a:rPr lang="en-AU" sz="1200" b="1" dirty="0" smtClean="0"/>
-              <a:t> TV </a:t>
-            </a:r>
-            <a:r>
-              <a:rPr lang="en-AU" sz="1200" b="1" dirty="0" smtClean="0"/>
-              <a:t>Show: </a:t>
+              <a:t> TV Show: </a:t>
             </a:r>
             <a:r>
               <a:rPr lang="en-AU" sz="1200" dirty="0" smtClean="0"/>
-              <a:t>The Walking Dead</a:t>
-            </a:r>
-            <a:endParaRPr lang="en-AU" sz="1200" dirty="0" smtClean="0"/>
+              <a:t>Homeland</a:t>
+            </a:r>
+            <a:endParaRPr lang="en-AU" sz="1200" b="1" dirty="0" smtClean="0"/>
           </a:p>
           <a:p>
             <a:pPr>
@@ -3716,11 +3739,63 @@
             </a:r>
             <a:r>
               <a:rPr lang="en-AU" sz="1200" dirty="0" smtClean="0"/>
-              <a:t>Shy, friendly, inquisitive</a:t>
-            </a:r>
-            <a:r>
-              <a:rPr lang="en-AU" sz="1200" dirty="0"/>
-              <a:t>.</a:t>
+              <a:t>Extroverted, enjoys meeting new people.</a:t>
+            </a:r>
+          </a:p>
+          <a:p>
+            <a:pPr>
+              <a:buNone/>
+            </a:pPr>
+            <a:r>
+              <a:rPr lang="en-AU" sz="1200" b="1" u="sng" dirty="0" smtClean="0"/>
+              <a:t>Internet </a:t>
+            </a:r>
+            <a:r>
+              <a:rPr lang="en-AU" sz="1200" b="1" u="sng" dirty="0" smtClean="0"/>
+              <a:t>usage</a:t>
+            </a:r>
+          </a:p>
+          <a:p>
+            <a:pPr>
+              <a:buNone/>
+            </a:pPr>
+            <a:r>
+              <a:rPr lang="en-AU" sz="1200" b="1" dirty="0" smtClean="0"/>
+              <a:t>Internet experience: </a:t>
+            </a:r>
+            <a:r>
+              <a:rPr lang="en-AU" sz="1200" dirty="0" smtClean="0"/>
+              <a:t>Advanced</a:t>
+            </a:r>
+          </a:p>
+          <a:p>
+            <a:pPr>
+              <a:buNone/>
+            </a:pPr>
+            <a:r>
+              <a:rPr lang="en-AU" sz="1200" b="1" dirty="0" smtClean="0"/>
+              <a:t>Primary Uses: </a:t>
+            </a:r>
+            <a:r>
+              <a:rPr lang="en-AU" sz="1200" dirty="0" smtClean="0"/>
+              <a:t>Studies, coding, email, blogging.</a:t>
+            </a:r>
+          </a:p>
+          <a:p>
+            <a:pPr>
+              <a:buNone/>
+            </a:pPr>
+            <a:r>
+              <a:rPr lang="en-AU" sz="1200" b="1" dirty="0" smtClean="0"/>
+              <a:t>Favourite Sites: </a:t>
+            </a:r>
+            <a:r>
+              <a:rPr lang="en-AU" sz="1200" dirty="0" smtClean="0"/>
+              <a:t>Reddit, Google, </a:t>
+            </a:r>
+            <a:r>
+              <a:rPr lang="en-AU" sz="1200" dirty="0" smtClean="0"/>
+              <a:t>WordPress</a:t>
             </a:r>
             <a:endParaRPr lang="en-AU" sz="1200" dirty="0" smtClean="0"/>
           </a:p>
@@ -3728,92 +3803,14 @@
             <a:pPr>
               <a:buNone/>
             </a:pPr>
-            <a:endParaRPr lang="en-AU" sz="1200" b="1" dirty="0" smtClean="0"/>
-          </a:p>
-          <a:p>
-            <a:pPr>
-              <a:buNone/>
-            </a:pPr>
-            <a:r>
-              <a:rPr lang="en-AU" sz="1200" b="1" u="sng" dirty="0" smtClean="0"/>
-              <a:t>Internet usage</a:t>
-            </a:r>
-          </a:p>
-          <a:p>
-            <a:pPr>
-              <a:buNone/>
-            </a:pPr>
             <a:r>
               <a:rPr lang="en-AU" sz="1200" b="1" dirty="0" smtClean="0"/>
-              <a:t>Internet </a:t>
-            </a:r>
-            <a:r>
-              <a:rPr lang="en-AU" sz="1200" b="1" dirty="0" smtClean="0"/>
-              <a:t>experience: </a:t>
+              <a:t>Hours online per week: </a:t>
             </a:r>
             <a:r>
               <a:rPr lang="en-AU" sz="1200" dirty="0" smtClean="0"/>
-              <a:t>Advanced (Online before School)</a:t>
-            </a:r>
-            <a:endParaRPr lang="en-AU" sz="1200" dirty="0" smtClean="0"/>
-          </a:p>
-          <a:p>
-            <a:pPr>
-              <a:buNone/>
-            </a:pPr>
-            <a:r>
-              <a:rPr lang="en-AU" sz="1200" b="1" dirty="0" smtClean="0"/>
-              <a:t>Primary </a:t>
-            </a:r>
-            <a:r>
-              <a:rPr lang="en-AU" sz="1200" b="1" dirty="0" smtClean="0"/>
-              <a:t>Uses: </a:t>
-            </a:r>
-            <a:r>
-              <a:rPr lang="en-AU" sz="1200" dirty="0" smtClean="0"/>
-              <a:t>Gaming, chat, videos, email</a:t>
-            </a:r>
-            <a:endParaRPr lang="en-AU" sz="1200" dirty="0" smtClean="0"/>
-          </a:p>
-          <a:p>
-            <a:pPr>
-              <a:buNone/>
-            </a:pPr>
-            <a:r>
-              <a:rPr lang="en-AU" sz="1200" b="1" dirty="0" smtClean="0"/>
-              <a:t>Favourite </a:t>
-            </a:r>
-            <a:r>
-              <a:rPr lang="en-AU" sz="1200" b="1" dirty="0" smtClean="0"/>
-              <a:t>Sites: </a:t>
-            </a:r>
-            <a:r>
-              <a:rPr lang="en-AU" sz="1200" dirty="0"/>
-              <a:t>F</a:t>
-            </a:r>
-            <a:r>
-              <a:rPr lang="en-AU" sz="1200" dirty="0" smtClean="0"/>
-              <a:t>acebook, YouTube, IGN</a:t>
-            </a:r>
-            <a:endParaRPr lang="en-AU" sz="1200" dirty="0" smtClean="0"/>
-          </a:p>
-          <a:p>
-            <a:pPr>
-              <a:buNone/>
-            </a:pPr>
-            <a:r>
-              <a:rPr lang="en-AU" sz="1200" b="1" dirty="0" smtClean="0"/>
-              <a:t>Hours online per </a:t>
-            </a:r>
-            <a:r>
-              <a:rPr lang="en-AU" sz="1200" b="1" dirty="0" smtClean="0"/>
-              <a:t>week: </a:t>
-            </a:r>
-            <a:r>
-              <a:rPr lang="en-AU" sz="1200" dirty="0" smtClean="0"/>
-              <a:t>25-30</a:t>
-            </a:r>
-            <a:endParaRPr lang="en-AU" sz="1200" dirty="0" smtClean="0"/>
+              <a:t>40+</a:t>
+            </a:r>
           </a:p>
           <a:p>
             <a:pPr>
@@ -3825,13 +3822,12 @@
             </a:r>
             <a:r>
               <a:rPr lang="en-AU" sz="1200" dirty="0" err="1" smtClean="0"/>
-              <a:t>Alienware</a:t>
+              <a:t>Macbook</a:t>
             </a:r>
             <a:r>
               <a:rPr lang="en-AU" sz="1200" dirty="0" smtClean="0"/>
-              <a:t>, ADSL2, Chrome</a:t>
-            </a:r>
-            <a:endParaRPr lang="en-AU" sz="1200" dirty="0" smtClean="0"/>
+              <a:t> Pro, ADSL2, Safari</a:t>
+            </a:r>
           </a:p>
           <a:p>
             <a:pPr>
@@ -3854,17 +3850,12 @@
             </a:pPr>
             <a:r>
               <a:rPr lang="en-AU" sz="1200" b="1" dirty="0" smtClean="0"/>
-              <a:t>Current </a:t>
-            </a:r>
-            <a:r>
-              <a:rPr lang="en-AU" sz="1200" b="1" dirty="0" smtClean="0"/>
-              <a:t>qualifications: </a:t>
+              <a:t>Current qualifications: </a:t>
             </a:r>
             <a:r>
               <a:rPr lang="en-AU" sz="1200" dirty="0" smtClean="0"/>
-              <a:t>Year 11</a:t>
-            </a:r>
-            <a:endParaRPr lang="en-AU" sz="1200" dirty="0" smtClean="0"/>
+              <a:t>Year 12,</a:t>
+            </a:r>
           </a:p>
           <a:p>
             <a:pPr>
@@ -3878,7 +3869,6 @@
               <a:rPr lang="en-AU" sz="1200" dirty="0" smtClean="0"/>
               <a:t>High Level</a:t>
             </a:r>
-            <a:endParaRPr lang="en-AU" sz="1200" dirty="0" smtClean="0"/>
           </a:p>
           <a:p>
             <a:pPr>
@@ -3886,15 +3876,56 @@
             </a:pPr>
             <a:r>
               <a:rPr lang="en-AU" sz="1200" b="1" dirty="0" smtClean="0"/>
-              <a:t>IT Skills/</a:t>
-            </a:r>
-            <a:r>
-              <a:rPr lang="en-AU" sz="1200" b="1" dirty="0" smtClean="0"/>
-              <a:t>knowledge: </a:t>
+              <a:t>IT Skills/knowledge: </a:t>
             </a:r>
             <a:r>
               <a:rPr lang="en-AU" sz="1200" dirty="0" smtClean="0"/>
-              <a:t>Very High, able to manipulate OS, basic Linux knowledge, understanding of code.</a:t>
+              <a:t>Advanced,</a:t>
+            </a:r>
+          </a:p>
+          <a:p>
+            <a:pPr>
+              <a:buNone/>
+            </a:pPr>
+            <a:r>
+              <a:rPr lang="en-AU" sz="1200" dirty="0"/>
+              <a:t>	</a:t>
+            </a:r>
+            <a:r>
+              <a:rPr lang="en-AU" sz="1200" dirty="0" smtClean="0"/>
+              <a:t>2</a:t>
+            </a:r>
+            <a:r>
+              <a:rPr lang="en-AU" sz="1200" baseline="30000" dirty="0" smtClean="0"/>
+              <a:t>nd</a:t>
+            </a:r>
+            <a:r>
+              <a:rPr lang="en-AU" sz="1200" dirty="0" smtClean="0"/>
+              <a:t> year </a:t>
+            </a:r>
+            <a:r>
+              <a:rPr lang="en-AU" sz="1200" smtClean="0"/>
+              <a:t>University </a:t>
+            </a:r>
+            <a:r>
+              <a:rPr lang="en-AU" sz="1200" smtClean="0"/>
+              <a:t>IT, </a:t>
+            </a:r>
+            <a:r>
+              <a:rPr lang="en-AU" sz="1200" dirty="0" smtClean="0"/>
+              <a:t>network administration, </a:t>
+            </a:r>
+            <a:r>
+              <a:rPr lang="en-AU" sz="1200" dirty="0" smtClean="0"/>
+              <a:t>coding</a:t>
+            </a:r>
+            <a:r>
+              <a:rPr lang="en-AU" sz="1200" smtClean="0"/>
+              <a:t>, </a:t>
+            </a:r>
+            <a:r>
+              <a:rPr lang="en-AU" sz="1200" smtClean="0"/>
+              <a:t>database design.</a:t>
             </a:r>
             <a:endParaRPr lang="en-AU" sz="1200" dirty="0" smtClean="0"/>
           </a:p>
@@ -3971,7 +4002,7 @@
                 </a:solidFill>
                 <a:latin typeface="Adobe Caslon Pro" pitchFamily="18" charset="0"/>
               </a:rPr>
-              <a:t>“Seeing code come to life is</a:t>
+              <a:t>“Live life to the fullest</a:t>
             </a:r>
             <a:r>
               <a:rPr lang="en-AU" sz="1400" i="1" dirty="0" smtClean="0">
@@ -3980,20 +4011,23 @@
                 </a:solidFill>
                 <a:latin typeface="Adobe Caslon Pro" pitchFamily="18" charset="0"/>
               </a:rPr>
-              <a:t> amazing”</a:t>
-            </a:r>
-            <a:endParaRPr lang="en-AU" sz="1400" i="1" dirty="0" smtClean="0">
-              <a:solidFill>
-                <a:schemeClr val="bg1"/>
-              </a:solidFill>
-              <a:latin typeface="Adobe Caslon Pro" pitchFamily="18" charset="0"/>
-            </a:endParaRPr>
+              <a:t>”</a:t>
+            </a:r>
           </a:p>
           <a:p>
             <a:pPr>
               <a:buFont typeface="Arial" pitchFamily="34" charset="0"/>
               <a:buChar char="•"/>
             </a:pPr>
+            <a:r>
+              <a:rPr lang="en-AU" sz="1100" dirty="0">
+                <a:solidFill>
+                  <a:schemeClr val="bg1"/>
+                </a:solidFill>
+                <a:latin typeface="+mj-lt"/>
+              </a:rPr>
+              <a:t> </a:t>
+            </a:r>
             <a:r>
               <a:rPr lang="en-AU" sz="1100" dirty="0" smtClean="0">
                 <a:solidFill>
@@ -4001,14 +4035,8 @@
                 </a:solidFill>
                 <a:latin typeface="+mj-lt"/>
               </a:rPr>
-              <a:t>Looking for a challenge</a:t>
-            </a:r>
-            <a:endParaRPr lang="en-AU" sz="1100" dirty="0" smtClean="0">
-              <a:solidFill>
-                <a:schemeClr val="bg1"/>
-              </a:solidFill>
-              <a:latin typeface="+mj-lt"/>
-            </a:endParaRPr>
+              <a:t>High achiever</a:t>
+            </a:r>
           </a:p>
           <a:p>
             <a:pPr>
@@ -4021,13 +4049,8 @@
                   <a:schemeClr val="bg1"/>
                 </a:solidFill>
               </a:rPr>
-              <a:t>Love for coding and figuring out problems</a:t>
-            </a:r>
-            <a:endParaRPr lang="en-AU" sz="1100" dirty="0" smtClean="0">
-              <a:solidFill>
-                <a:schemeClr val="bg1"/>
-              </a:solidFill>
-            </a:endParaRPr>
+              <a:t>Experienced coder</a:t>
+            </a:r>
           </a:p>
           <a:p>
             <a:pPr>
@@ -4040,34 +4063,205 @@
                   <a:schemeClr val="bg1"/>
                 </a:solidFill>
               </a:rPr>
-              <a:t>Unsure what to do </a:t>
-            </a:r>
-            <a:r>
-              <a:rPr lang="en-AU" sz="1100" dirty="0" smtClean="0">
-                <a:solidFill>
-                  <a:schemeClr val="bg1"/>
-                </a:solidFill>
-              </a:rPr>
-              <a:t>after high school</a:t>
-            </a:r>
-            <a:endParaRPr lang="en-AU" sz="1100" dirty="0" smtClean="0">
-              <a:solidFill>
-                <a:schemeClr val="bg1"/>
-              </a:solidFill>
-            </a:endParaRPr>
+              <a:t>Looking for job opportunities in IT</a:t>
+            </a:r>
+          </a:p>
+        </p:txBody>
+      </p:sp>
+      <p:sp>
+        <p:nvSpPr>
+          <p:cNvPr id="10" name="TextBox 9"/>
+          <p:cNvSpPr txBox="1"/>
+          <p:nvPr/>
+        </p:nvSpPr>
+        <p:spPr>
+          <a:xfrm>
+            <a:off x="500034" y="3929066"/>
+            <a:ext cx="2928958" cy="1846659"/>
+          </a:xfrm>
+          <a:prstGeom prst="rect">
+            <a:avLst/>
+          </a:prstGeom>
+          <a:noFill/>
+        </p:spPr>
+        <p:txBody>
+          <a:bodyPr wrap="square" rtlCol="0">
+            <a:spAutoFit/>
+          </a:bodyPr>
+          <a:lstStyle/>
+          <a:p>
+            <a:r>
+              <a:rPr lang="en-AU" b="1" dirty="0" smtClean="0"/>
+              <a:t>User Goals</a:t>
+            </a:r>
+          </a:p>
+          <a:p>
+            <a:r>
+              <a:rPr lang="en-AU" sz="1200" dirty="0" smtClean="0"/>
+              <a:t>Patrick comes to the site to</a:t>
+            </a:r>
+            <a:r>
+              <a:rPr lang="is-IS" sz="1200" dirty="0" smtClean="0"/>
+              <a:t>…</a:t>
+            </a:r>
+          </a:p>
+          <a:p>
+            <a:pPr marL="171450" indent="-171450">
+              <a:buFont typeface="Arial"/>
+              <a:buChar char="•"/>
+            </a:pPr>
+            <a:r>
+              <a:rPr lang="is-IS" sz="1200" dirty="0" smtClean="0"/>
+              <a:t>Register interest in the coding competition</a:t>
+            </a:r>
+          </a:p>
+          <a:p>
+            <a:pPr marL="171450" indent="-171450">
+              <a:buFont typeface="Arial"/>
+              <a:buChar char="•"/>
+            </a:pPr>
+            <a:r>
+              <a:rPr lang="is-IS" sz="1200" dirty="0" smtClean="0"/>
+              <a:t>Make connections with potential employers in the IT industry</a:t>
+            </a:r>
+          </a:p>
+          <a:p>
+            <a:pPr marL="171450" indent="-171450">
+              <a:buFont typeface="Arial"/>
+              <a:buChar char="•"/>
+            </a:pPr>
+            <a:r>
+              <a:rPr lang="is-IS" sz="1200" dirty="0" smtClean="0"/>
+              <a:t>Test his skills against other people in his field</a:t>
+            </a:r>
+          </a:p>
+          <a:p>
+            <a:pPr marL="171450" indent="-171450">
+              <a:buFont typeface="Arial"/>
+              <a:buChar char="•"/>
+            </a:pPr>
+            <a:endParaRPr lang="is-IS" sz="1200" dirty="0" smtClean="0"/>
+          </a:p>
+        </p:txBody>
+      </p:sp>
+      <p:sp>
+        <p:nvSpPr>
+          <p:cNvPr id="11" name="TextBox 10"/>
+          <p:cNvSpPr txBox="1"/>
+          <p:nvPr/>
+        </p:nvSpPr>
+        <p:spPr>
+          <a:xfrm>
+            <a:off x="3428992" y="3929066"/>
+            <a:ext cx="2928958" cy="1661993"/>
+          </a:xfrm>
+          <a:prstGeom prst="rect">
+            <a:avLst/>
+          </a:prstGeom>
+          <a:noFill/>
+        </p:spPr>
+        <p:txBody>
+          <a:bodyPr wrap="square" rtlCol="0">
+            <a:spAutoFit/>
+          </a:bodyPr>
+          <a:lstStyle/>
+          <a:p>
+            <a:r>
+              <a:rPr lang="en-AU" b="1" dirty="0" smtClean="0"/>
+              <a:t>Business Objectives</a:t>
+            </a:r>
+          </a:p>
+          <a:p>
+            <a:r>
+              <a:rPr lang="en-AU" sz="1200" dirty="0" smtClean="0"/>
+              <a:t>We want Chris to</a:t>
+            </a:r>
+            <a:r>
+              <a:rPr lang="is-IS" sz="1200" dirty="0" smtClean="0"/>
+              <a:t>…</a:t>
+            </a:r>
+          </a:p>
+          <a:p>
+            <a:pPr marL="171450" indent="-171450">
+              <a:buFont typeface="Arial"/>
+              <a:buChar char="•"/>
+            </a:pPr>
+            <a:r>
+              <a:rPr lang="is-IS" sz="1200" dirty="0" smtClean="0"/>
+              <a:t>Visit the site often</a:t>
+            </a:r>
+          </a:p>
+          <a:p>
+            <a:pPr marL="171450" indent="-171450">
+              <a:buFont typeface="Arial"/>
+              <a:buChar char="•"/>
+            </a:pPr>
+            <a:r>
+              <a:rPr lang="is-IS" sz="1200" dirty="0" smtClean="0"/>
+              <a:t>Be excited about the competition</a:t>
+            </a:r>
+          </a:p>
+          <a:p>
+            <a:pPr marL="171450" indent="-171450">
+              <a:buFont typeface="Arial"/>
+              <a:buChar char="•"/>
+            </a:pPr>
+            <a:r>
+              <a:rPr lang="is-IS" sz="1200" dirty="0" smtClean="0"/>
+              <a:t>Feel e</a:t>
+            </a:r>
+            <a:r>
+              <a:rPr lang="is-IS" sz="1200" dirty="0" smtClean="0"/>
+              <a:t>ncouraged </a:t>
+            </a:r>
+            <a:r>
+              <a:rPr lang="is-IS" sz="1200" dirty="0" smtClean="0"/>
+              <a:t>about finding job </a:t>
+            </a:r>
+          </a:p>
+          <a:p>
+            <a:pPr marL="171450" indent="-171450">
+              <a:buFont typeface="Arial"/>
+              <a:buChar char="•"/>
+            </a:pPr>
+            <a:r>
+              <a:rPr lang="is-IS" sz="1200" dirty="0" smtClean="0"/>
+              <a:t>opportunities</a:t>
+            </a:r>
+          </a:p>
+          <a:p>
+            <a:pPr marL="171450" indent="-171450">
+              <a:buFont typeface="Arial"/>
+              <a:buChar char="•"/>
+            </a:pPr>
+            <a:r>
+              <a:rPr lang="is-IS" sz="1200" dirty="0" smtClean="0"/>
+              <a:t>Recommend the site to friends</a:t>
+            </a:r>
+          </a:p>
+          <a:p>
+            <a:pPr marL="171450" indent="-171450">
+              <a:buFont typeface="Arial"/>
+              <a:buChar char="•"/>
+            </a:pPr>
+            <a:r>
+              <a:rPr lang="is-IS" sz="1200" dirty="0" smtClean="0"/>
+              <a:t>Review past entries</a:t>
+            </a:r>
+            <a:endParaRPr lang="en-AU" sz="1200" dirty="0" smtClean="0"/>
           </a:p>
         </p:txBody>
       </p:sp>
       <p:pic>
         <p:nvPicPr>
-          <p:cNvPr id="9" name="Picture 3"/>
+          <p:cNvPr id="2" name="Picture 1"/>
           <p:cNvPicPr>
-            <a:picLocks noChangeAspect="1" noChangeArrowheads="1"/>
+            <a:picLocks noChangeAspect="1"/>
           </p:cNvPicPr>
           <p:nvPr/>
         </p:nvPicPr>
         <p:blipFill>
-          <a:blip r:embed="rId3" cstate="print">
+          <a:blip r:embed="rId3">
             <a:extLst>
               <a:ext uri="{28A0092B-C50C-407E-A947-70E740481C1C}">
                 <a14:useLocalDpi xmlns:a14="http://schemas.microsoft.com/office/drawing/2010/main" val="0"/>
@@ -4078,231 +4272,16 @@
             <a:fillRect/>
           </a:stretch>
         </p:blipFill>
-        <p:spPr bwMode="auto">
+        <p:spPr>
           <a:xfrm>
-            <a:off x="3491880" y="285728"/>
-            <a:ext cx="2044533" cy="1143008"/>
+            <a:off x="3563888" y="294802"/>
+            <a:ext cx="1080120" cy="1133934"/>
           </a:xfrm>
           <a:prstGeom prst="rect">
             <a:avLst/>
           </a:prstGeom>
-          <a:noFill/>
-          <a:ln w="9525">
-            <a:noFill/>
-            <a:miter lim="800000"/>
-            <a:headEnd/>
-            <a:tailEnd/>
-          </a:ln>
         </p:spPr>
       </p:pic>
-      <p:sp>
-        <p:nvSpPr>
-          <p:cNvPr id="10" name="TextBox 9"/>
-          <p:cNvSpPr txBox="1"/>
-          <p:nvPr/>
-        </p:nvSpPr>
-        <p:spPr>
-          <a:xfrm>
-            <a:off x="500034" y="3929066"/>
-            <a:ext cx="2928958" cy="1661994"/>
-          </a:xfrm>
-          <a:prstGeom prst="rect">
-            <a:avLst/>
-          </a:prstGeom>
-          <a:noFill/>
-        </p:spPr>
-        <p:txBody>
-          <a:bodyPr wrap="square" rtlCol="0">
-            <a:spAutoFit/>
-          </a:bodyPr>
-          <a:lstStyle/>
-          <a:p>
-            <a:r>
-              <a:rPr lang="en-AU" b="1" dirty="0" smtClean="0"/>
-              <a:t>User </a:t>
-            </a:r>
-            <a:r>
-              <a:rPr lang="en-AU" b="1" dirty="0" smtClean="0"/>
-              <a:t>Goals</a:t>
-            </a:r>
-          </a:p>
-          <a:p>
-            <a:r>
-              <a:rPr lang="en-AU" sz="1200" dirty="0" smtClean="0"/>
-              <a:t>Chris comes to the site to</a:t>
-            </a:r>
-            <a:r>
-              <a:rPr lang="is-IS" sz="1200" dirty="0" smtClean="0"/>
-              <a:t>…</a:t>
-            </a:r>
-          </a:p>
-          <a:p>
-            <a:pPr marL="171450" indent="-171450">
-              <a:buFont typeface="Arial"/>
-              <a:buChar char="•"/>
-            </a:pPr>
-            <a:r>
-              <a:rPr lang="is-IS" sz="1200" dirty="0" smtClean="0"/>
-              <a:t>Learn more about what others are doing</a:t>
-            </a:r>
-          </a:p>
-          <a:p>
-            <a:pPr marL="171450" indent="-171450">
-              <a:buFont typeface="Arial"/>
-              <a:buChar char="•"/>
-            </a:pPr>
-            <a:r>
-              <a:rPr lang="is-IS" sz="1200" dirty="0" smtClean="0"/>
-              <a:t>Find pathways for what to do after year 12</a:t>
-            </a:r>
-          </a:p>
-          <a:p>
-            <a:pPr marL="171450" indent="-171450">
-              <a:buFont typeface="Arial"/>
-              <a:buChar char="•"/>
-            </a:pPr>
-            <a:r>
-              <a:rPr lang="is-IS" sz="1200" dirty="0" smtClean="0"/>
-              <a:t>See what level he needs to be at</a:t>
-            </a:r>
-          </a:p>
-          <a:p>
-            <a:pPr marL="171450" indent="-171450">
-              <a:buFont typeface="Arial"/>
-              <a:buChar char="•"/>
-            </a:pPr>
-            <a:r>
-              <a:rPr lang="is-IS" sz="1200" dirty="0" smtClean="0"/>
-              <a:t>Find ideas for making things himself</a:t>
-            </a:r>
-          </a:p>
-          <a:p>
-            <a:pPr marL="171450" indent="-171450">
-              <a:buFont typeface="Arial"/>
-              <a:buChar char="•"/>
-            </a:pPr>
-            <a:r>
-              <a:rPr lang="is-IS" sz="1200" dirty="0" smtClean="0"/>
-              <a:t>Discover companies in the industry</a:t>
-            </a:r>
-            <a:endParaRPr lang="en-AU" sz="1200" dirty="0" smtClean="0"/>
-          </a:p>
-        </p:txBody>
-      </p:sp>
-      <p:sp>
-        <p:nvSpPr>
-          <p:cNvPr id="11" name="TextBox 10"/>
-          <p:cNvSpPr txBox="1"/>
-          <p:nvPr/>
-        </p:nvSpPr>
-        <p:spPr>
-          <a:xfrm>
-            <a:off x="3563888" y="3933056"/>
-            <a:ext cx="2928958" cy="1846659"/>
-          </a:xfrm>
-          <a:prstGeom prst="rect">
-            <a:avLst/>
-          </a:prstGeom>
-          <a:noFill/>
-        </p:spPr>
-        <p:txBody>
-          <a:bodyPr wrap="square" rtlCol="0">
-            <a:spAutoFit/>
-          </a:bodyPr>
-          <a:lstStyle/>
-          <a:p>
-            <a:r>
-              <a:rPr lang="en-AU" b="1" dirty="0" smtClean="0"/>
-              <a:t>Business </a:t>
-            </a:r>
-            <a:r>
-              <a:rPr lang="en-AU" b="1" dirty="0" smtClean="0"/>
-              <a:t>Objectives</a:t>
-            </a:r>
-          </a:p>
-          <a:p>
-            <a:r>
-              <a:rPr lang="en-AU" sz="1200" dirty="0" smtClean="0"/>
-              <a:t>We want Chris to</a:t>
-            </a:r>
-            <a:r>
-              <a:rPr lang="is-IS" sz="1200" dirty="0" smtClean="0"/>
-              <a:t>…</a:t>
-            </a:r>
-          </a:p>
-          <a:p>
-            <a:pPr marL="171450" indent="-171450">
-              <a:buFont typeface="Arial"/>
-              <a:buChar char="•"/>
-            </a:pPr>
-            <a:r>
-              <a:rPr lang="is-IS" sz="1200" dirty="0" smtClean="0"/>
-              <a:t>Visit the site often</a:t>
-            </a:r>
-          </a:p>
-          <a:p>
-            <a:pPr marL="171450" indent="-171450">
-              <a:buFont typeface="Arial"/>
-              <a:buChar char="•"/>
-            </a:pPr>
-            <a:r>
-              <a:rPr lang="is-IS" sz="1200" dirty="0" smtClean="0"/>
-              <a:t>Be excited about coding</a:t>
-            </a:r>
-          </a:p>
-          <a:p>
-            <a:pPr marL="171450" indent="-171450">
-              <a:buFont typeface="Arial"/>
-              <a:buChar char="•"/>
-            </a:pPr>
-            <a:r>
-              <a:rPr lang="is-IS" sz="1200" dirty="0" smtClean="0"/>
-              <a:t>Be excited about his future</a:t>
-            </a:r>
-          </a:p>
-          <a:p>
-            <a:pPr marL="171450" indent="-171450">
-              <a:buFont typeface="Arial"/>
-              <a:buChar char="•"/>
-            </a:pPr>
-            <a:r>
-              <a:rPr lang="is-IS" sz="1200" dirty="0" smtClean="0"/>
-              <a:t>Feel CDU will give him that future</a:t>
-            </a:r>
-          </a:p>
-          <a:p>
-            <a:pPr marL="171450" indent="-171450">
-              <a:buFont typeface="Arial"/>
-              <a:buChar char="•"/>
-            </a:pPr>
-            <a:r>
-              <a:rPr lang="is-IS" sz="1200" dirty="0" smtClean="0"/>
-              <a:t>Want to sign up while at CDU</a:t>
-            </a:r>
-          </a:p>
-          <a:p>
-            <a:pPr marL="171450" indent="-171450">
-              <a:buFont typeface="Arial"/>
-              <a:buChar char="•"/>
-            </a:pPr>
-            <a:r>
-              <a:rPr lang="is-IS" sz="1200" dirty="0" smtClean="0"/>
-              <a:t>Recommend the site to friends</a:t>
-            </a:r>
-          </a:p>
-          <a:p>
-            <a:pPr marL="171450" indent="-171450">
-              <a:buFont typeface="Arial"/>
-              <a:buChar char="•"/>
-            </a:pPr>
-            <a:r>
-              <a:rPr lang="is-IS" sz="1200" dirty="0" smtClean="0"/>
-              <a:t>Review past entries</a:t>
-            </a:r>
-            <a:endParaRPr lang="en-AU" sz="1200" dirty="0" smtClean="0"/>
-          </a:p>
-        </p:txBody>
-      </p:sp>
     </p:spTree>
     <p:custDataLst>
       <p:tags r:id="rId1"/>
@@ -4314,7 +4293,7 @@
   <p:timing>
     <p:tnLst>
       <p:par>
-        <p:cTn xmlns:p14="http://schemas.microsoft.com/office/powerpoint/2010/main" id="1" dur="indefinite" restart="never" nodeType="tmRoot"/>
+        <p:cTn id="1" dur="indefinite" restart="never" nodeType="tmRoot"/>
       </p:par>
     </p:tnLst>
   </p:timing>

</xml_diff>

<commit_message>
Upload persona, file restructure
</commit_message>
<xml_diff>
--- a/working_documents/Milestone2/KB - persona.pptx
+++ b/working_documents/Milestone2/KB - persona.pptx
@@ -223,7 +223,7 @@
             <a:fld id="{7F10169D-3332-4DE4-A7B4-328D07E50BA1}" type="datetimeFigureOut">
               <a:rPr lang="en-US" smtClean="0"/>
               <a:pPr/>
-              <a:t>4/29/17</a:t>
+              <a:t>5/7/17</a:t>
             </a:fld>
             <a:endParaRPr lang="en-AU"/>
           </a:p>
@@ -676,7 +676,7 @@
             <a:fld id="{DB698D08-D57D-4DF4-80C4-65B2586D98E9}" type="datetimeFigureOut">
               <a:rPr lang="en-US" smtClean="0"/>
               <a:pPr/>
-              <a:t>4/29/17</a:t>
+              <a:t>5/7/17</a:t>
             </a:fld>
             <a:endParaRPr lang="en-AU"/>
           </a:p>
@@ -843,7 +843,7 @@
             <a:fld id="{DB698D08-D57D-4DF4-80C4-65B2586D98E9}" type="datetimeFigureOut">
               <a:rPr lang="en-US" smtClean="0"/>
               <a:pPr/>
-              <a:t>4/29/17</a:t>
+              <a:t>5/7/17</a:t>
             </a:fld>
             <a:endParaRPr lang="en-AU"/>
           </a:p>
@@ -1020,7 +1020,7 @@
             <a:fld id="{DB698D08-D57D-4DF4-80C4-65B2586D98E9}" type="datetimeFigureOut">
               <a:rPr lang="en-US" smtClean="0"/>
               <a:pPr/>
-              <a:t>4/29/17</a:t>
+              <a:t>5/7/17</a:t>
             </a:fld>
             <a:endParaRPr lang="en-AU"/>
           </a:p>
@@ -1187,7 +1187,7 @@
             <a:fld id="{DB698D08-D57D-4DF4-80C4-65B2586D98E9}" type="datetimeFigureOut">
               <a:rPr lang="en-US" smtClean="0"/>
               <a:pPr/>
-              <a:t>4/29/17</a:t>
+              <a:t>5/7/17</a:t>
             </a:fld>
             <a:endParaRPr lang="en-AU"/>
           </a:p>
@@ -1430,7 +1430,7 @@
             <a:fld id="{DB698D08-D57D-4DF4-80C4-65B2586D98E9}" type="datetimeFigureOut">
               <a:rPr lang="en-US" smtClean="0"/>
               <a:pPr/>
-              <a:t>4/29/17</a:t>
+              <a:t>5/7/17</a:t>
             </a:fld>
             <a:endParaRPr lang="en-AU"/>
           </a:p>
@@ -1715,7 +1715,7 @@
             <a:fld id="{DB698D08-D57D-4DF4-80C4-65B2586D98E9}" type="datetimeFigureOut">
               <a:rPr lang="en-US" smtClean="0"/>
               <a:pPr/>
-              <a:t>4/29/17</a:t>
+              <a:t>5/7/17</a:t>
             </a:fld>
             <a:endParaRPr lang="en-AU"/>
           </a:p>
@@ -2134,7 +2134,7 @@
             <a:fld id="{DB698D08-D57D-4DF4-80C4-65B2586D98E9}" type="datetimeFigureOut">
               <a:rPr lang="en-US" smtClean="0"/>
               <a:pPr/>
-              <a:t>4/29/17</a:t>
+              <a:t>5/7/17</a:t>
             </a:fld>
             <a:endParaRPr lang="en-AU"/>
           </a:p>
@@ -2249,7 +2249,7 @@
             <a:fld id="{DB698D08-D57D-4DF4-80C4-65B2586D98E9}" type="datetimeFigureOut">
               <a:rPr lang="en-US" smtClean="0"/>
               <a:pPr/>
-              <a:t>4/29/17</a:t>
+              <a:t>5/7/17</a:t>
             </a:fld>
             <a:endParaRPr lang="en-AU"/>
           </a:p>
@@ -2341,7 +2341,7 @@
             <a:fld id="{DB698D08-D57D-4DF4-80C4-65B2586D98E9}" type="datetimeFigureOut">
               <a:rPr lang="en-US" smtClean="0"/>
               <a:pPr/>
-              <a:t>4/29/17</a:t>
+              <a:t>5/7/17</a:t>
             </a:fld>
             <a:endParaRPr lang="en-AU"/>
           </a:p>
@@ -2615,7 +2615,7 @@
             <a:fld id="{DB698D08-D57D-4DF4-80C4-65B2586D98E9}" type="datetimeFigureOut">
               <a:rPr lang="en-US" smtClean="0"/>
               <a:pPr/>
-              <a:t>4/29/17</a:t>
+              <a:t>5/7/17</a:t>
             </a:fld>
             <a:endParaRPr lang="en-AU"/>
           </a:p>
@@ -2865,7 +2865,7 @@
             <a:fld id="{DB698D08-D57D-4DF4-80C4-65B2586D98E9}" type="datetimeFigureOut">
               <a:rPr lang="en-US" smtClean="0"/>
               <a:pPr/>
-              <a:t>4/29/17</a:t>
+              <a:t>5/7/17</a:t>
             </a:fld>
             <a:endParaRPr lang="en-AU"/>
           </a:p>
@@ -3075,7 +3075,7 @@
             <a:fld id="{DB698D08-D57D-4DF4-80C4-65B2586D98E9}" type="datetimeFigureOut">
               <a:rPr lang="en-US" smtClean="0"/>
               <a:pPr/>
-              <a:t>4/29/17</a:t>
+              <a:t>5/7/17</a:t>
             </a:fld>
             <a:endParaRPr lang="en-AU"/>
           </a:p>
@@ -3748,11 +3748,7 @@
             </a:pPr>
             <a:r>
               <a:rPr lang="en-AU" sz="1200" b="1" u="sng" dirty="0" smtClean="0"/>
-              <a:t>Internet </a:t>
-            </a:r>
-            <a:r>
-              <a:rPr lang="en-AU" sz="1200" b="1" u="sng" dirty="0" smtClean="0"/>
-              <a:t>usage</a:t>
+              <a:t>Internet usage</a:t>
             </a:r>
           </a:p>
           <a:p>
@@ -3791,13 +3787,8 @@
             </a:r>
             <a:r>
               <a:rPr lang="en-AU" sz="1200" dirty="0" smtClean="0"/>
-              <a:t>Reddit, Google, </a:t>
-            </a:r>
-            <a:r>
-              <a:rPr lang="en-AU" sz="1200" dirty="0" smtClean="0"/>
-              <a:t>WordPress</a:t>
-            </a:r>
-            <a:endParaRPr lang="en-AU" sz="1200" dirty="0" smtClean="0"/>
+              <a:t>Reddit, Google, WordPress</a:t>
+            </a:r>
           </a:p>
           <a:p>
             <a:pPr>
@@ -3905,27 +3896,15 @@
             </a:r>
             <a:r>
               <a:rPr lang="en-AU" sz="1200" smtClean="0"/>
-              <a:t>University </a:t>
+              <a:t>University IT, </a:t>
+            </a:r>
+            <a:r>
+              <a:rPr lang="en-AU" sz="1200" dirty="0" smtClean="0"/>
+              <a:t>network administration, coding</a:t>
             </a:r>
             <a:r>
               <a:rPr lang="en-AU" sz="1200" smtClean="0"/>
-              <a:t>IT, </a:t>
-            </a:r>
-            <a:r>
-              <a:rPr lang="en-AU" sz="1200" dirty="0" smtClean="0"/>
-              <a:t>network administration, </a:t>
-            </a:r>
-            <a:r>
-              <a:rPr lang="en-AU" sz="1200" dirty="0" smtClean="0"/>
-              <a:t>coding</a:t>
-            </a:r>
-            <a:r>
-              <a:rPr lang="en-AU" sz="1200" smtClean="0"/>
-              <a:t>, </a:t>
-            </a:r>
-            <a:r>
-              <a:rPr lang="en-AU" sz="1200" smtClean="0"/>
-              <a:t>database design.</a:t>
+              <a:t>, database design.</a:t>
             </a:r>
             <a:endParaRPr lang="en-AU" sz="1200" dirty="0" smtClean="0"/>
           </a:p>
@@ -4174,7 +4153,11 @@
           <a:p>
             <a:r>
               <a:rPr lang="en-AU" sz="1200" dirty="0" smtClean="0"/>
-              <a:t>We want Chris to</a:t>
+              <a:t>We want </a:t>
+            </a:r>
+            <a:r>
+              <a:rPr lang="en-AU" sz="1200" dirty="0" smtClean="0"/>
+              <a:t>Patrick to</a:t>
             </a:r>
             <a:r>
               <a:rPr lang="is-IS" sz="1200" dirty="0" smtClean="0"/>
@@ -4208,15 +4191,7 @@
             </a:pPr>
             <a:r>
               <a:rPr lang="is-IS" sz="1200" dirty="0" smtClean="0"/>
-              <a:t>Feel e</a:t>
-            </a:r>
-            <a:r>
-              <a:rPr lang="is-IS" sz="1200" dirty="0" smtClean="0"/>
-              <a:t>ncouraged </a:t>
-            </a:r>
-            <a:r>
-              <a:rPr lang="is-IS" sz="1200" dirty="0" smtClean="0"/>
-              <a:t>about finding job </a:t>
+              <a:t>Feel encouraged about finding job </a:t>
             </a:r>
           </a:p>
           <a:p>

</xml_diff>

<commit_message>
-Refresh master due to milestone merge failure
</commit_message>
<xml_diff>
--- a/working_documents/Milestone2/KB - persona.pptx
+++ b/working_documents/Milestone2/KB - persona.pptx
@@ -223,7 +223,7 @@
             <a:fld id="{7F10169D-3332-4DE4-A7B4-328D07E50BA1}" type="datetimeFigureOut">
               <a:rPr lang="en-US" smtClean="0"/>
               <a:pPr/>
-              <a:t>4/29/17</a:t>
+              <a:t>5/7/17</a:t>
             </a:fld>
             <a:endParaRPr lang="en-AU"/>
           </a:p>
@@ -676,7 +676,7 @@
             <a:fld id="{DB698D08-D57D-4DF4-80C4-65B2586D98E9}" type="datetimeFigureOut">
               <a:rPr lang="en-US" smtClean="0"/>
               <a:pPr/>
-              <a:t>4/29/17</a:t>
+              <a:t>5/7/17</a:t>
             </a:fld>
             <a:endParaRPr lang="en-AU"/>
           </a:p>
@@ -843,7 +843,7 @@
             <a:fld id="{DB698D08-D57D-4DF4-80C4-65B2586D98E9}" type="datetimeFigureOut">
               <a:rPr lang="en-US" smtClean="0"/>
               <a:pPr/>
-              <a:t>4/29/17</a:t>
+              <a:t>5/7/17</a:t>
             </a:fld>
             <a:endParaRPr lang="en-AU"/>
           </a:p>
@@ -1020,7 +1020,7 @@
             <a:fld id="{DB698D08-D57D-4DF4-80C4-65B2586D98E9}" type="datetimeFigureOut">
               <a:rPr lang="en-US" smtClean="0"/>
               <a:pPr/>
-              <a:t>4/29/17</a:t>
+              <a:t>5/7/17</a:t>
             </a:fld>
             <a:endParaRPr lang="en-AU"/>
           </a:p>
@@ -1187,7 +1187,7 @@
             <a:fld id="{DB698D08-D57D-4DF4-80C4-65B2586D98E9}" type="datetimeFigureOut">
               <a:rPr lang="en-US" smtClean="0"/>
               <a:pPr/>
-              <a:t>4/29/17</a:t>
+              <a:t>5/7/17</a:t>
             </a:fld>
             <a:endParaRPr lang="en-AU"/>
           </a:p>
@@ -1430,7 +1430,7 @@
             <a:fld id="{DB698D08-D57D-4DF4-80C4-65B2586D98E9}" type="datetimeFigureOut">
               <a:rPr lang="en-US" smtClean="0"/>
               <a:pPr/>
-              <a:t>4/29/17</a:t>
+              <a:t>5/7/17</a:t>
             </a:fld>
             <a:endParaRPr lang="en-AU"/>
           </a:p>
@@ -1715,7 +1715,7 @@
             <a:fld id="{DB698D08-D57D-4DF4-80C4-65B2586D98E9}" type="datetimeFigureOut">
               <a:rPr lang="en-US" smtClean="0"/>
               <a:pPr/>
-              <a:t>4/29/17</a:t>
+              <a:t>5/7/17</a:t>
             </a:fld>
             <a:endParaRPr lang="en-AU"/>
           </a:p>
@@ -2134,7 +2134,7 @@
             <a:fld id="{DB698D08-D57D-4DF4-80C4-65B2586D98E9}" type="datetimeFigureOut">
               <a:rPr lang="en-US" smtClean="0"/>
               <a:pPr/>
-              <a:t>4/29/17</a:t>
+              <a:t>5/7/17</a:t>
             </a:fld>
             <a:endParaRPr lang="en-AU"/>
           </a:p>
@@ -2249,7 +2249,7 @@
             <a:fld id="{DB698D08-D57D-4DF4-80C4-65B2586D98E9}" type="datetimeFigureOut">
               <a:rPr lang="en-US" smtClean="0"/>
               <a:pPr/>
-              <a:t>4/29/17</a:t>
+              <a:t>5/7/17</a:t>
             </a:fld>
             <a:endParaRPr lang="en-AU"/>
           </a:p>
@@ -2341,7 +2341,7 @@
             <a:fld id="{DB698D08-D57D-4DF4-80C4-65B2586D98E9}" type="datetimeFigureOut">
               <a:rPr lang="en-US" smtClean="0"/>
               <a:pPr/>
-              <a:t>4/29/17</a:t>
+              <a:t>5/7/17</a:t>
             </a:fld>
             <a:endParaRPr lang="en-AU"/>
           </a:p>
@@ -2615,7 +2615,7 @@
             <a:fld id="{DB698D08-D57D-4DF4-80C4-65B2586D98E9}" type="datetimeFigureOut">
               <a:rPr lang="en-US" smtClean="0"/>
               <a:pPr/>
-              <a:t>4/29/17</a:t>
+              <a:t>5/7/17</a:t>
             </a:fld>
             <a:endParaRPr lang="en-AU"/>
           </a:p>
@@ -2865,7 +2865,7 @@
             <a:fld id="{DB698D08-D57D-4DF4-80C4-65B2586D98E9}" type="datetimeFigureOut">
               <a:rPr lang="en-US" smtClean="0"/>
               <a:pPr/>
-              <a:t>4/29/17</a:t>
+              <a:t>5/7/17</a:t>
             </a:fld>
             <a:endParaRPr lang="en-AU"/>
           </a:p>
@@ -3075,7 +3075,7 @@
             <a:fld id="{DB698D08-D57D-4DF4-80C4-65B2586D98E9}" type="datetimeFigureOut">
               <a:rPr lang="en-US" smtClean="0"/>
               <a:pPr/>
-              <a:t>4/29/17</a:t>
+              <a:t>5/7/17</a:t>
             </a:fld>
             <a:endParaRPr lang="en-AU"/>
           </a:p>
@@ -3748,11 +3748,7 @@
             </a:pPr>
             <a:r>
               <a:rPr lang="en-AU" sz="1200" b="1" u="sng" dirty="0" smtClean="0"/>
-              <a:t>Internet </a:t>
-            </a:r>
-            <a:r>
-              <a:rPr lang="en-AU" sz="1200" b="1" u="sng" dirty="0" smtClean="0"/>
-              <a:t>usage</a:t>
+              <a:t>Internet usage</a:t>
             </a:r>
           </a:p>
           <a:p>
@@ -3791,13 +3787,8 @@
             </a:r>
             <a:r>
               <a:rPr lang="en-AU" sz="1200" dirty="0" smtClean="0"/>
-              <a:t>Reddit, Google, </a:t>
-            </a:r>
-            <a:r>
-              <a:rPr lang="en-AU" sz="1200" dirty="0" smtClean="0"/>
-              <a:t>WordPress</a:t>
-            </a:r>
-            <a:endParaRPr lang="en-AU" sz="1200" dirty="0" smtClean="0"/>
+              <a:t>Reddit, Google, WordPress</a:t>
+            </a:r>
           </a:p>
           <a:p>
             <a:pPr>
@@ -3905,27 +3896,15 @@
             </a:r>
             <a:r>
               <a:rPr lang="en-AU" sz="1200" smtClean="0"/>
-              <a:t>University </a:t>
+              <a:t>University IT, </a:t>
+            </a:r>
+            <a:r>
+              <a:rPr lang="en-AU" sz="1200" dirty="0" smtClean="0"/>
+              <a:t>network administration, coding</a:t>
             </a:r>
             <a:r>
               <a:rPr lang="en-AU" sz="1200" smtClean="0"/>
-              <a:t>IT, </a:t>
-            </a:r>
-            <a:r>
-              <a:rPr lang="en-AU" sz="1200" dirty="0" smtClean="0"/>
-              <a:t>network administration, </a:t>
-            </a:r>
-            <a:r>
-              <a:rPr lang="en-AU" sz="1200" dirty="0" smtClean="0"/>
-              <a:t>coding</a:t>
-            </a:r>
-            <a:r>
-              <a:rPr lang="en-AU" sz="1200" smtClean="0"/>
-              <a:t>, </a:t>
-            </a:r>
-            <a:r>
-              <a:rPr lang="en-AU" sz="1200" smtClean="0"/>
-              <a:t>database design.</a:t>
+              <a:t>, database design.</a:t>
             </a:r>
             <a:endParaRPr lang="en-AU" sz="1200" dirty="0" smtClean="0"/>
           </a:p>
@@ -4174,7 +4153,11 @@
           <a:p>
             <a:r>
               <a:rPr lang="en-AU" sz="1200" dirty="0" smtClean="0"/>
-              <a:t>We want Chris to</a:t>
+              <a:t>We want </a:t>
+            </a:r>
+            <a:r>
+              <a:rPr lang="en-AU" sz="1200" dirty="0" smtClean="0"/>
+              <a:t>Patrick to</a:t>
             </a:r>
             <a:r>
               <a:rPr lang="is-IS" sz="1200" dirty="0" smtClean="0"/>
@@ -4208,15 +4191,7 @@
             </a:pPr>
             <a:r>
               <a:rPr lang="is-IS" sz="1200" dirty="0" smtClean="0"/>
-              <a:t>Feel e</a:t>
-            </a:r>
-            <a:r>
-              <a:rPr lang="is-IS" sz="1200" dirty="0" smtClean="0"/>
-              <a:t>ncouraged </a:t>
-            </a:r>
-            <a:r>
-              <a:rPr lang="is-IS" sz="1200" dirty="0" smtClean="0"/>
-              <a:t>about finding job </a:t>
+              <a:t>Feel encouraged about finding job </a:t>
             </a:r>
           </a:p>
           <a:p>

</xml_diff>